<commit_message>
change diagrams in ppt
</commit_message>
<xml_diff>
--- a/sales.pptx
+++ b/sales.pptx
@@ -20252,12 +20252,47 @@
           </a:p>
         </p:txBody>
       </p:sp>
+      <p:sp>
+        <p:nvSpPr>
+          <p:cNvPr id="6" name="TextBox 5">
+            <a:extLst>
+              <a:ext uri="{FF2B5EF4-FFF2-40B4-BE49-F238E27FC236}">
+                <a16:creationId xmlns:a16="http://schemas.microsoft.com/office/drawing/2014/main" id="{4FF99A6B-3C10-4EB2-AEBD-96E412345FA9}"/>
+              </a:ext>
+            </a:extLst>
+          </p:cNvPr>
+          <p:cNvSpPr txBox="1"/>
+          <p:nvPr/>
+        </p:nvSpPr>
+        <p:spPr>
+          <a:xfrm>
+            <a:off x="6388404" y="1115512"/>
+            <a:ext cx="5332412" cy="923330"/>
+          </a:xfrm>
+          <a:prstGeom prst="rect">
+            <a:avLst/>
+          </a:prstGeom>
+          <a:noFill/>
+        </p:spPr>
+        <p:txBody>
+          <a:bodyPr wrap="square" rtlCol="0">
+            <a:spAutoFit/>
+          </a:bodyPr>
+          <a:lstStyle/>
+          <a:p>
+            <a:r>
+              <a:rPr lang="en-US" dirty="0"/>
+              <a:t>People bought few Christmas items in November pertaining to availability in the next month.</a:t>
+            </a:r>
+          </a:p>
+        </p:txBody>
+      </p:sp>
       <p:pic>
         <p:nvPicPr>
-          <p:cNvPr id="5" name="Picture 4">
+          <p:cNvPr id="4" name="Picture 3">
             <a:extLst>
               <a:ext uri="{FF2B5EF4-FFF2-40B4-BE49-F238E27FC236}">
-                <a16:creationId xmlns:a16="http://schemas.microsoft.com/office/drawing/2014/main" id="{54AD5428-7BCF-42BD-8D09-2E0ABC99DD08}"/>
+                <a16:creationId xmlns:a16="http://schemas.microsoft.com/office/drawing/2014/main" id="{BEE65298-897D-47B3-83CE-CB2999343AC3}"/>
               </a:ext>
             </a:extLst>
           </p:cNvPr>
@@ -20274,49 +20309,14 @@
         </p:blipFill>
         <p:spPr>
           <a:xfrm>
-            <a:off x="5035506" y="1798669"/>
-            <a:ext cx="6924675" cy="3733800"/>
+            <a:off x="5039009" y="2038843"/>
+            <a:ext cx="7136030" cy="4110166"/>
           </a:xfrm>
           <a:prstGeom prst="rect">
             <a:avLst/>
           </a:prstGeom>
         </p:spPr>
       </p:pic>
-      <p:sp>
-        <p:nvSpPr>
-          <p:cNvPr id="6" name="TextBox 5">
-            <a:extLst>
-              <a:ext uri="{FF2B5EF4-FFF2-40B4-BE49-F238E27FC236}">
-                <a16:creationId xmlns:a16="http://schemas.microsoft.com/office/drawing/2014/main" id="{4FF99A6B-3C10-4EB2-AEBD-96E412345FA9}"/>
-              </a:ext>
-            </a:extLst>
-          </p:cNvPr>
-          <p:cNvSpPr txBox="1"/>
-          <p:nvPr/>
-        </p:nvSpPr>
-        <p:spPr>
-          <a:xfrm>
-            <a:off x="6388404" y="1115512"/>
-            <a:ext cx="5332412" cy="646331"/>
-          </a:xfrm>
-          <a:prstGeom prst="rect">
-            <a:avLst/>
-          </a:prstGeom>
-          <a:noFill/>
-        </p:spPr>
-        <p:txBody>
-          <a:bodyPr wrap="square" rtlCol="0">
-            <a:spAutoFit/>
-          </a:bodyPr>
-          <a:lstStyle/>
-          <a:p>
-            <a:r>
-              <a:rPr lang="en-US" dirty="0"/>
-              <a:t>People bought few Christmas items in Nov pertaining to availability in the next month</a:t>
-            </a:r>
-          </a:p>
-        </p:txBody>
-      </p:sp>
     </p:spTree>
     <p:extLst>
       <p:ext uri="{BB962C8B-B14F-4D97-AF65-F5344CB8AC3E}">
@@ -22240,15 +22240,7 @@
           <a:p>
             <a:r>
               <a:rPr lang="en-US" dirty="0"/>
-              <a:t>Only product sold in December was Little Birdie. Making it </a:t>
-            </a:r>
-            <a:r>
-              <a:rPr lang="en-US" dirty="0" err="1"/>
-              <a:t>suspiscious</a:t>
-            </a:r>
-            <a:r>
-              <a:rPr lang="en-US" dirty="0"/>
-              <a:t>.</a:t>
+              <a:t>Only product sold in December was Little Birdie. Making it suspicious.</a:t>
             </a:r>
           </a:p>
         </p:txBody>
@@ -40083,7 +40075,7 @@
         <p:spPr>
           <a:xfrm>
             <a:off x="5711687" y="1130603"/>
-            <a:ext cx="4876800" cy="646331"/>
+            <a:ext cx="4876800" cy="923330"/>
           </a:xfrm>
           <a:prstGeom prst="rect">
             <a:avLst/>
@@ -40098,15 +40090,7 @@
           <a:p>
             <a:r>
               <a:rPr lang="en-US" dirty="0"/>
-              <a:t>Justifies the total spend more in dec and </a:t>
-            </a:r>
-            <a:r>
-              <a:rPr lang="en-US" dirty="0" err="1"/>
-              <a:t>nov</a:t>
-            </a:r>
-            <a:r>
-              <a:rPr lang="en-US" dirty="0"/>
-              <a:t> from previous slide. </a:t>
+              <a:t>Justifies the total spend more in December and November from previous slide. </a:t>
             </a:r>
           </a:p>
         </p:txBody>

</xml_diff>